<commit_message>
Posibles ideas agregadas a ptx
</commit_message>
<xml_diff>
--- a/MeyerMTrabajoSoftwareLibre.pptx
+++ b/MeyerMTrabajoSoftwareLibre.pptx
@@ -4,6 +4,9 @@
   <p:sldMasterIdLst>
     <p:sldMasterId id="2147483648" r:id="rId1"/>
   </p:sldMasterIdLst>
+  <p:sldIdLst>
+    <p:sldId id="256" r:id="rId2"/>
+  </p:sldIdLst>
   <p:sldSz cx="9144000" cy="6858000" type="screen4x3"/>
   <p:notesSz cx="6858000" cy="9144000"/>
   <p:defaultTextStyle>
@@ -285,7 +288,7 @@
           <a:p>
             <a:fld id="{7A847CFC-816F-41D0-AAC0-9BF4FEBC753E}" type="datetimeFigureOut">
               <a:rPr lang="es-ES" smtClean="0"/>
-              <a:t>06/10/2006</a:t>
+              <a:t>10/12/2018</a:t>
             </a:fld>
             <a:endParaRPr lang="es-ES"/>
           </a:p>
@@ -450,7 +453,7 @@
           <a:p>
             <a:fld id="{7A847CFC-816F-41D0-AAC0-9BF4FEBC753E}" type="datetimeFigureOut">
               <a:rPr lang="es-ES" smtClean="0"/>
-              <a:t>06/10/2006</a:t>
+              <a:t>10/12/2018</a:t>
             </a:fld>
             <a:endParaRPr lang="es-ES"/>
           </a:p>
@@ -625,7 +628,7 @@
           <a:p>
             <a:fld id="{7A847CFC-816F-41D0-AAC0-9BF4FEBC753E}" type="datetimeFigureOut">
               <a:rPr lang="es-ES" smtClean="0"/>
-              <a:t>06/10/2006</a:t>
+              <a:t>10/12/2018</a:t>
             </a:fld>
             <a:endParaRPr lang="es-ES"/>
           </a:p>
@@ -790,7 +793,7 @@
           <a:p>
             <a:fld id="{7A847CFC-816F-41D0-AAC0-9BF4FEBC753E}" type="datetimeFigureOut">
               <a:rPr lang="es-ES" smtClean="0"/>
-              <a:t>06/10/2006</a:t>
+              <a:t>10/12/2018</a:t>
             </a:fld>
             <a:endParaRPr lang="es-ES"/>
           </a:p>
@@ -1031,7 +1034,7 @@
           <a:p>
             <a:fld id="{7A847CFC-816F-41D0-AAC0-9BF4FEBC753E}" type="datetimeFigureOut">
               <a:rPr lang="es-ES" smtClean="0"/>
-              <a:t>06/10/2006</a:t>
+              <a:t>10/12/2018</a:t>
             </a:fld>
             <a:endParaRPr lang="es-ES"/>
           </a:p>
@@ -1314,7 +1317,7 @@
           <a:p>
             <a:fld id="{7A847CFC-816F-41D0-AAC0-9BF4FEBC753E}" type="datetimeFigureOut">
               <a:rPr lang="es-ES" smtClean="0"/>
-              <a:t>06/10/2006</a:t>
+              <a:t>10/12/2018</a:t>
             </a:fld>
             <a:endParaRPr lang="es-ES"/>
           </a:p>
@@ -1731,7 +1734,7 @@
           <a:p>
             <a:fld id="{7A847CFC-816F-41D0-AAC0-9BF4FEBC753E}" type="datetimeFigureOut">
               <a:rPr lang="es-ES" smtClean="0"/>
-              <a:t>06/10/2006</a:t>
+              <a:t>10/12/2018</a:t>
             </a:fld>
             <a:endParaRPr lang="es-ES"/>
           </a:p>
@@ -1844,7 +1847,7 @@
           <a:p>
             <a:fld id="{7A847CFC-816F-41D0-AAC0-9BF4FEBC753E}" type="datetimeFigureOut">
               <a:rPr lang="es-ES" smtClean="0"/>
-              <a:t>06/10/2006</a:t>
+              <a:t>10/12/2018</a:t>
             </a:fld>
             <a:endParaRPr lang="es-ES"/>
           </a:p>
@@ -1934,7 +1937,7 @@
           <a:p>
             <a:fld id="{7A847CFC-816F-41D0-AAC0-9BF4FEBC753E}" type="datetimeFigureOut">
               <a:rPr lang="es-ES" smtClean="0"/>
-              <a:t>06/10/2006</a:t>
+              <a:t>10/12/2018</a:t>
             </a:fld>
             <a:endParaRPr lang="es-ES"/>
           </a:p>
@@ -2206,7 +2209,7 @@
           <a:p>
             <a:fld id="{7A847CFC-816F-41D0-AAC0-9BF4FEBC753E}" type="datetimeFigureOut">
               <a:rPr lang="es-ES" smtClean="0"/>
-              <a:t>06/10/2006</a:t>
+              <a:t>10/12/2018</a:t>
             </a:fld>
             <a:endParaRPr lang="es-ES"/>
           </a:p>
@@ -2454,7 +2457,7 @@
           <a:p>
             <a:fld id="{7A847CFC-816F-41D0-AAC0-9BF4FEBC753E}" type="datetimeFigureOut">
               <a:rPr lang="es-ES" smtClean="0"/>
-              <a:t>06/10/2006</a:t>
+              <a:t>10/12/2018</a:t>
             </a:fld>
             <a:endParaRPr lang="es-ES"/>
           </a:p>
@@ -2662,7 +2665,7 @@
           <a:p>
             <a:fld id="{7A847CFC-816F-41D0-AAC0-9BF4FEBC753E}" type="datetimeFigureOut">
               <a:rPr lang="es-ES" smtClean="0"/>
-              <a:t>06/10/2006</a:t>
+              <a:t>10/12/2018</a:t>
             </a:fld>
             <a:endParaRPr lang="es-ES"/>
           </a:p>
@@ -3013,6 +3016,108 @@
     </p:otherStyle>
   </p:txStyles>
 </p:sldMaster>
+</file>
+
+<file path=ppt/slides/slide1.xml><?xml version="1.0" encoding="utf-8"?>
+<p:sld xmlns:a="http://schemas.openxmlformats.org/drawingml/2006/main" xmlns:r="http://schemas.openxmlformats.org/officeDocument/2006/relationships" xmlns:p="http://schemas.openxmlformats.org/presentationml/2006/main">
+  <p:cSld>
+    <p:spTree>
+      <p:nvGrpSpPr>
+        <p:cNvPr id="1" name=""/>
+        <p:cNvGrpSpPr/>
+        <p:nvPr/>
+      </p:nvGrpSpPr>
+      <p:grpSpPr>
+        <a:xfrm>
+          <a:off x="0" y="0"/>
+          <a:ext cx="0" cy="0"/>
+          <a:chOff x="0" y="0"/>
+          <a:chExt cx="0" cy="0"/>
+        </a:xfrm>
+      </p:grpSpPr>
+      <p:sp>
+        <p:nvSpPr>
+          <p:cNvPr id="2" name="1 Título"/>
+          <p:cNvSpPr>
+            <a:spLocks noGrp="1"/>
+          </p:cNvSpPr>
+          <p:nvPr>
+            <p:ph type="ctrTitle"/>
+          </p:nvPr>
+        </p:nvSpPr>
+        <p:spPr/>
+        <p:txBody>
+          <a:bodyPr/>
+          <a:lstStyle/>
+          <a:p>
+            <a:r>
+              <a:rPr lang="es-VE" dirty="0" smtClean="0"/>
+              <a:t>Juegos </a:t>
+            </a:r>
+            <a:r>
+              <a:rPr lang="es-VE" dirty="0" err="1" smtClean="0"/>
+              <a:t>opensource</a:t>
+            </a:r>
+            <a:endParaRPr lang="es-VE" dirty="0"/>
+          </a:p>
+        </p:txBody>
+      </p:sp>
+      <p:sp>
+        <p:nvSpPr>
+          <p:cNvPr id="3" name="2 Subtítulo"/>
+          <p:cNvSpPr>
+            <a:spLocks noGrp="1"/>
+          </p:cNvSpPr>
+          <p:nvPr>
+            <p:ph type="subTitle" idx="1"/>
+          </p:nvPr>
+        </p:nvSpPr>
+        <p:spPr/>
+        <p:txBody>
+          <a:bodyPr>
+            <a:normAutofit fontScale="85000" lnSpcReduction="20000"/>
+          </a:bodyPr>
+          <a:lstStyle/>
+          <a:p>
+            <a:r>
+              <a:rPr lang="es-VE" dirty="0" err="1" smtClean="0"/>
+              <a:t>Freeciv</a:t>
+            </a:r>
+            <a:endParaRPr lang="es-VE" dirty="0"/>
+          </a:p>
+          <a:p>
+            <a:r>
+              <a:rPr lang="es-VE" dirty="0" smtClean="0"/>
+              <a:t>2048</a:t>
+            </a:r>
+          </a:p>
+          <a:p>
+            <a:r>
+              <a:rPr lang="es-VE" dirty="0" err="1" smtClean="0"/>
+              <a:t>NetHack</a:t>
+            </a:r>
+            <a:endParaRPr lang="es-VE" dirty="0" smtClean="0"/>
+          </a:p>
+          <a:p>
+            <a:r>
+              <a:rPr lang="es-VE" smtClean="0"/>
+              <a:t>0 A.D.</a:t>
+            </a:r>
+            <a:endParaRPr lang="es-VE"/>
+          </a:p>
+        </p:txBody>
+      </p:sp>
+    </p:spTree>
+    <p:extLst>
+      <p:ext uri="{BB962C8B-B14F-4D97-AF65-F5344CB8AC3E}">
+        <p14:creationId xmlns:p14="http://schemas.microsoft.com/office/powerpoint/2010/main" val="2602549743"/>
+      </p:ext>
+    </p:extLst>
+  </p:cSld>
+  <p:clrMapOvr>
+    <a:masterClrMapping/>
+  </p:clrMapOvr>
+</p:sld>
 </file>
 
 <file path=ppt/theme/theme1.xml><?xml version="1.0" encoding="utf-8"?>

</xml_diff>